<commit_message>
added REST_API + Database
</commit_message>
<xml_diff>
--- a/doc/Zwischen-Präsentation.pptx
+++ b/doc/Zwischen-Präsentation.pptx
@@ -8,10 +8,7 @@
     <p:sldId id="256" r:id="rId2"/>
     <p:sldId id="257" r:id="rId3"/>
     <p:sldId id="258" r:id="rId4"/>
-    <p:sldId id="260" r:id="rId5"/>
-    <p:sldId id="261" r:id="rId6"/>
-    <p:sldId id="262" r:id="rId7"/>
-    <p:sldId id="259" r:id="rId8"/>
+    <p:sldId id="259" r:id="rId5"/>
   </p:sldIdLst>
   <p:sldSz cx="12192000" cy="6858000"/>
   <p:notesSz cx="6858000" cy="9144000"/>
@@ -110,6 +107,11 @@
       </a:defRPr>
     </a:lvl9pPr>
   </p:defaultTextStyle>
+  <p:extLst>
+    <p:ext uri="{EFAFB233-063F-42B5-8137-9DF3F51BA10A}">
+      <p15:sldGuideLst xmlns:p15="http://schemas.microsoft.com/office/powerpoint/2012/main"/>
+    </p:ext>
+  </p:extLst>
 </p:presentation>
 </file>
 
@@ -117,8 +119,8 @@
 <pc:chgInfo xmlns:a="http://schemas.openxmlformats.org/drawingml/2006/main" xmlns:r="http://schemas.openxmlformats.org/officeDocument/2006/relationships" xmlns:ac="http://schemas.microsoft.com/office/drawing/2013/main/command" xmlns:pc="http://schemas.microsoft.com/office/powerpoint/2013/main/command">
   <pc:docChgLst>
     <pc:chgData name="PEER Josef" userId="e6d23605-5bc1-4049-bd85-9a25b5fe4c82" providerId="ADAL" clId="{DA522EBC-1D59-41C8-91E3-0B32F6A2E8C6}"/>
-    <pc:docChg chg="undo redo custSel addSld modSld">
-      <pc:chgData name="PEER Josef" userId="e6d23605-5bc1-4049-bd85-9a25b5fe4c82" providerId="ADAL" clId="{DA522EBC-1D59-41C8-91E3-0B32F6A2E8C6}" dt="2025-05-19T07:21:00.496" v="533" actId="26606"/>
+    <pc:docChg chg="undo redo custSel addSld delSld modSld">
+      <pc:chgData name="PEER Josef" userId="e6d23605-5bc1-4049-bd85-9a25b5fe4c82" providerId="ADAL" clId="{DA522EBC-1D59-41C8-91E3-0B32F6A2E8C6}" dt="2025-05-19T09:24:30.797" v="536" actId="47"/>
       <pc:docMkLst>
         <pc:docMk/>
       </pc:docMkLst>
@@ -262,8 +264,8 @@
           </ac:spMkLst>
         </pc:spChg>
       </pc:sldChg>
-      <pc:sldChg chg="addSp delSp modSp new mod setBg">
-        <pc:chgData name="PEER Josef" userId="e6d23605-5bc1-4049-bd85-9a25b5fe4c82" providerId="ADAL" clId="{DA522EBC-1D59-41C8-91E3-0B32F6A2E8C6}" dt="2025-05-19T07:19:46.700" v="527" actId="26606"/>
+      <pc:sldChg chg="addSp delSp modSp new del mod setBg">
+        <pc:chgData name="PEER Josef" userId="e6d23605-5bc1-4049-bd85-9a25b5fe4c82" providerId="ADAL" clId="{DA522EBC-1D59-41C8-91E3-0B32F6A2E8C6}" dt="2025-05-19T09:24:27.616" v="534" actId="47"/>
         <pc:sldMkLst>
           <pc:docMk/>
           <pc:sldMk cId="390203009" sldId="260"/>
@@ -589,8 +591,8 @@
           </ac:cxnSpMkLst>
         </pc:cxnChg>
       </pc:sldChg>
-      <pc:sldChg chg="addSp delSp modSp new mod setBg">
-        <pc:chgData name="PEER Josef" userId="e6d23605-5bc1-4049-bd85-9a25b5fe4c82" providerId="ADAL" clId="{DA522EBC-1D59-41C8-91E3-0B32F6A2E8C6}" dt="2025-05-19T07:21:00.496" v="533" actId="26606"/>
+      <pc:sldChg chg="addSp delSp modSp new del mod setBg">
+        <pc:chgData name="PEER Josef" userId="e6d23605-5bc1-4049-bd85-9a25b5fe4c82" providerId="ADAL" clId="{DA522EBC-1D59-41C8-91E3-0B32F6A2E8C6}" dt="2025-05-19T09:24:28.902" v="535" actId="47"/>
         <pc:sldMkLst>
           <pc:docMk/>
           <pc:sldMk cId="3913988485" sldId="261"/>
@@ -668,8 +670,8 @@
           </ac:picMkLst>
         </pc:picChg>
       </pc:sldChg>
-      <pc:sldChg chg="addSp delSp modSp new mod setBg">
-        <pc:chgData name="PEER Josef" userId="e6d23605-5bc1-4049-bd85-9a25b5fe4c82" providerId="ADAL" clId="{DA522EBC-1D59-41C8-91E3-0B32F6A2E8C6}" dt="2025-05-19T07:19:27.379" v="525" actId="962"/>
+      <pc:sldChg chg="addSp delSp modSp new del mod setBg">
+        <pc:chgData name="PEER Josef" userId="e6d23605-5bc1-4049-bd85-9a25b5fe4c82" providerId="ADAL" clId="{DA522EBC-1D59-41C8-91E3-0B32F6A2E8C6}" dt="2025-05-19T09:24:30.797" v="536" actId="47"/>
         <pc:sldMkLst>
           <pc:docMk/>
           <pc:sldMk cId="1150393402" sldId="262"/>
@@ -10222,888 +10224,6 @@
 <file path=ppt/slides/slide4.xml><?xml version="1.0" encoding="utf-8"?>
 <p:sld xmlns:a="http://schemas.openxmlformats.org/drawingml/2006/main" xmlns:r="http://schemas.openxmlformats.org/officeDocument/2006/relationships" xmlns:p="http://schemas.openxmlformats.org/presentationml/2006/main">
   <p:cSld>
-    <p:bg>
-      <p:bgPr>
-        <a:solidFill>
-          <a:schemeClr val="bg1"/>
-        </a:solidFill>
-        <a:effectLst/>
-      </p:bgPr>
-    </p:bg>
-    <p:spTree>
-      <p:nvGrpSpPr>
-        <p:cNvPr id="1" name=""/>
-        <p:cNvGrpSpPr/>
-        <p:nvPr/>
-      </p:nvGrpSpPr>
-      <p:grpSpPr>
-        <a:xfrm>
-          <a:off x="0" y="0"/>
-          <a:ext cx="0" cy="0"/>
-          <a:chOff x="0" y="0"/>
-          <a:chExt cx="0" cy="0"/>
-        </a:xfrm>
-      </p:grpSpPr>
-      <p:sp>
-        <p:nvSpPr>
-          <p:cNvPr id="2" name="Titel 1">
-            <a:extLst>
-              <a:ext uri="{FF2B5EF4-FFF2-40B4-BE49-F238E27FC236}">
-                <a16:creationId xmlns:a16="http://schemas.microsoft.com/office/drawing/2014/main" id="{77392DFE-2535-9B37-1938-402B663F247B}"/>
-              </a:ext>
-            </a:extLst>
-          </p:cNvPr>
-          <p:cNvSpPr>
-            <a:spLocks noGrp="1"/>
-          </p:cNvSpPr>
-          <p:nvPr>
-            <p:ph type="title"/>
-          </p:nvPr>
-        </p:nvSpPr>
-        <p:spPr>
-          <a:xfrm>
-            <a:off x="838199" y="1320126"/>
-            <a:ext cx="3806729" cy="3072359"/>
-          </a:xfrm>
-        </p:spPr>
-        <p:txBody>
-          <a:bodyPr vert="horz" lIns="91440" tIns="45720" rIns="91440" bIns="45720" rtlCol="0" anchor="t">
-            <a:normAutofit/>
-          </a:bodyPr>
-          <a:lstStyle/>
-          <a:p>
-            <a:r>
-              <a:rPr lang="en-US" sz="4000" kern="1200">
-                <a:solidFill>
-                  <a:schemeClr val="tx1"/>
-                </a:solidFill>
-                <a:latin typeface="+mj-lt"/>
-                <a:ea typeface="+mj-ea"/>
-                <a:cs typeface="+mj-cs"/>
-              </a:rPr>
-              <a:t>	ER-Diagramm</a:t>
-            </a:r>
-          </a:p>
-        </p:txBody>
-      </p:sp>
-      <p:pic>
-        <p:nvPicPr>
-          <p:cNvPr id="40" name="Inhaltsplatzhalter 39">
-            <a:extLst>
-              <a:ext uri="{FF2B5EF4-FFF2-40B4-BE49-F238E27FC236}">
-                <a16:creationId xmlns:a16="http://schemas.microsoft.com/office/drawing/2014/main" id="{5B5F37EA-DA1D-0A8B-518E-49249C7B7E70}"/>
-              </a:ext>
-            </a:extLst>
-          </p:cNvPr>
-          <p:cNvPicPr>
-            <a:picLocks noGrp="1" noChangeAspect="1"/>
-          </p:cNvPicPr>
-          <p:nvPr>
-            <p:ph idx="1"/>
-          </p:nvPr>
-        </p:nvPicPr>
-        <p:blipFill>
-          <a:blip r:embed="rId2"/>
-          <a:stretch>
-            <a:fillRect/>
-          </a:stretch>
-        </p:blipFill>
-        <p:spPr>
-          <a:xfrm>
-            <a:off x="5463389" y="1181996"/>
-            <a:ext cx="5941497" cy="4352147"/>
-          </a:xfrm>
-          <a:prstGeom prst="rect">
-            <a:avLst/>
-          </a:prstGeom>
-        </p:spPr>
-      </p:pic>
-      <p:grpSp>
-        <p:nvGrpSpPr>
-          <p:cNvPr id="49" name="Group 48">
-            <a:extLst>
-              <a:ext uri="{FF2B5EF4-FFF2-40B4-BE49-F238E27FC236}">
-                <a16:creationId xmlns:a16="http://schemas.microsoft.com/office/drawing/2014/main" id="{71E4E172-1EA7-E251-8265-AD4D67315470}"/>
-              </a:ext>
-              <a:ext uri="{C183D7F6-B498-43B3-948B-1728B52AA6E4}">
-                <adec:decorative xmlns:adec="http://schemas.microsoft.com/office/drawing/2017/decorative" val="1"/>
-              </a:ext>
-            </a:extLst>
-          </p:cNvPr>
-          <p:cNvGrpSpPr>
-            <a:grpSpLocks noGrp="1" noUngrp="1" noRot="1" noChangeAspect="1" noMove="1" noResize="1"/>
-          </p:cNvGrpSpPr>
-          <p:nvPr>
-            <p:extLst>
-              <p:ext uri="{386F3935-93C4-4BCD-93E2-E3B085C9AB24}">
-                <p16:designElem xmlns:p16="http://schemas.microsoft.com/office/powerpoint/2015/main" val="1"/>
-              </p:ext>
-            </p:extLst>
-          </p:nvPr>
-        </p:nvGrpSpPr>
-        <p:grpSpPr>
-          <a:xfrm>
-            <a:off x="-5025" y="6737718"/>
-            <a:ext cx="12207200" cy="123363"/>
-            <a:chOff x="-5025" y="6737718"/>
-            <a:chExt cx="12207200" cy="123363"/>
-          </a:xfrm>
-        </p:grpSpPr>
-        <p:sp>
-          <p:nvSpPr>
-            <p:cNvPr id="50" name="Rectangle 49">
-              <a:extLst>
-                <a:ext uri="{FF2B5EF4-FFF2-40B4-BE49-F238E27FC236}">
-                  <a16:creationId xmlns:a16="http://schemas.microsoft.com/office/drawing/2014/main" id="{B36EE4C1-7905-4652-A645-D2C3112E2F79}"/>
-                </a:ext>
-                <a:ext uri="{C183D7F6-B498-43B3-948B-1728B52AA6E4}">
-                  <adec:decorative xmlns:adec="http://schemas.microsoft.com/office/drawing/2017/decorative" val="1"/>
-                </a:ext>
-              </a:extLst>
-            </p:cNvPr>
-            <p:cNvSpPr/>
-            <p:nvPr>
-              <p:extLst>
-                <p:ext uri="{386F3935-93C4-4BCD-93E2-E3B085C9AB24}">
-                  <p16:designElem xmlns:p16="http://schemas.microsoft.com/office/powerpoint/2015/main" val="1"/>
-                </p:ext>
-              </p:extLst>
-            </p:nvPr>
-          </p:nvSpPr>
-          <p:spPr>
-            <a:xfrm rot="5400000" flipH="1">
-              <a:off x="6036894" y="695800"/>
-              <a:ext cx="123362" cy="12207199"/>
-            </a:xfrm>
-            <a:prstGeom prst="rect">
-              <a:avLst/>
-            </a:prstGeom>
-            <a:gradFill>
-              <a:gsLst>
-                <a:gs pos="0">
-                  <a:schemeClr val="accent5"/>
-                </a:gs>
-                <a:gs pos="100000">
-                  <a:schemeClr val="accent2"/>
-                </a:gs>
-              </a:gsLst>
-              <a:lin ang="1800000" scaled="0"/>
-            </a:gradFill>
-            <a:ln>
-              <a:noFill/>
-            </a:ln>
-          </p:spPr>
-          <p:style>
-            <a:lnRef idx="2">
-              <a:schemeClr val="accent1">
-                <a:shade val="50000"/>
-              </a:schemeClr>
-            </a:lnRef>
-            <a:fillRef idx="1">
-              <a:schemeClr val="accent1"/>
-            </a:fillRef>
-            <a:effectRef idx="0">
-              <a:schemeClr val="accent1"/>
-            </a:effectRef>
-            <a:fontRef idx="minor">
-              <a:schemeClr val="lt1"/>
-            </a:fontRef>
-          </p:style>
-          <p:txBody>
-            <a:bodyPr rtlCol="0" anchor="ctr"/>
-            <a:lstStyle/>
-            <a:p>
-              <a:pPr algn="ctr"/>
-              <a:endParaRPr lang="en-US"/>
-            </a:p>
-          </p:txBody>
-        </p:sp>
-        <p:sp>
-          <p:nvSpPr>
-            <p:cNvPr id="51" name="Rectangle 50">
-              <a:extLst>
-                <a:ext uri="{FF2B5EF4-FFF2-40B4-BE49-F238E27FC236}">
-                  <a16:creationId xmlns:a16="http://schemas.microsoft.com/office/drawing/2014/main" id="{5B2D6870-BDC0-AE8B-A7F5-D570327D12E0}"/>
-                </a:ext>
-                <a:ext uri="{C183D7F6-B498-43B3-948B-1728B52AA6E4}">
-                  <adec:decorative xmlns:adec="http://schemas.microsoft.com/office/drawing/2017/decorative" val="1"/>
-                </a:ext>
-              </a:extLst>
-            </p:cNvPr>
-            <p:cNvSpPr/>
-            <p:nvPr>
-              <p:extLst>
-                <p:ext uri="{386F3935-93C4-4BCD-93E2-E3B085C9AB24}">
-                  <p16:designElem xmlns:p16="http://schemas.microsoft.com/office/powerpoint/2015/main" val="1"/>
-                </p:ext>
-              </p:extLst>
-            </p:nvPr>
-          </p:nvSpPr>
-          <p:spPr>
-            <a:xfrm rot="16200000">
-              <a:off x="9176406" y="3835311"/>
-              <a:ext cx="123362" cy="5928176"/>
-            </a:xfrm>
-            <a:prstGeom prst="rect">
-              <a:avLst/>
-            </a:prstGeom>
-            <a:gradFill>
-              <a:gsLst>
-                <a:gs pos="19000">
-                  <a:schemeClr val="accent5">
-                    <a:alpha val="0"/>
-                  </a:schemeClr>
-                </a:gs>
-                <a:gs pos="100000">
-                  <a:schemeClr val="accent5">
-                    <a:lumMod val="60000"/>
-                    <a:lumOff val="40000"/>
-                  </a:schemeClr>
-                </a:gs>
-              </a:gsLst>
-              <a:lin ang="600000" scaled="0"/>
-            </a:gradFill>
-            <a:ln>
-              <a:noFill/>
-            </a:ln>
-          </p:spPr>
-          <p:style>
-            <a:lnRef idx="2">
-              <a:schemeClr val="accent1">
-                <a:shade val="50000"/>
-              </a:schemeClr>
-            </a:lnRef>
-            <a:fillRef idx="1">
-              <a:schemeClr val="accent1"/>
-            </a:fillRef>
-            <a:effectRef idx="0">
-              <a:schemeClr val="accent1"/>
-            </a:effectRef>
-            <a:fontRef idx="minor">
-              <a:schemeClr val="lt1"/>
-            </a:fontRef>
-          </p:style>
-          <p:txBody>
-            <a:bodyPr rtlCol="0" anchor="ctr"/>
-            <a:lstStyle/>
-            <a:p>
-              <a:pPr algn="ctr"/>
-              <a:endParaRPr lang="en-US"/>
-            </a:p>
-          </p:txBody>
-        </p:sp>
-      </p:grpSp>
-    </p:spTree>
-    <p:extLst>
-      <p:ext uri="{BB962C8B-B14F-4D97-AF65-F5344CB8AC3E}">
-        <p14:creationId xmlns:p14="http://schemas.microsoft.com/office/powerpoint/2010/main" val="390203009"/>
-      </p:ext>
-    </p:extLst>
-  </p:cSld>
-  <p:clrMapOvr>
-    <a:masterClrMapping/>
-  </p:clrMapOvr>
-</p:sld>
-</file>
-
-<file path=ppt/slides/slide5.xml><?xml version="1.0" encoding="utf-8"?>
-<p:sld xmlns:a="http://schemas.openxmlformats.org/drawingml/2006/main" xmlns:r="http://schemas.openxmlformats.org/officeDocument/2006/relationships" xmlns:p="http://schemas.openxmlformats.org/presentationml/2006/main">
-  <p:cSld>
-    <p:bg>
-      <p:bgPr>
-        <a:solidFill>
-          <a:schemeClr val="bg1"/>
-        </a:solidFill>
-        <a:effectLst/>
-      </p:bgPr>
-    </p:bg>
-    <p:spTree>
-      <p:nvGrpSpPr>
-        <p:cNvPr id="1" name=""/>
-        <p:cNvGrpSpPr/>
-        <p:nvPr/>
-      </p:nvGrpSpPr>
-      <p:grpSpPr>
-        <a:xfrm>
-          <a:off x="0" y="0"/>
-          <a:ext cx="0" cy="0"/>
-          <a:chOff x="0" y="0"/>
-          <a:chExt cx="0" cy="0"/>
-        </a:xfrm>
-      </p:grpSpPr>
-      <p:sp>
-        <p:nvSpPr>
-          <p:cNvPr id="2" name="Titel 1">
-            <a:extLst>
-              <a:ext uri="{FF2B5EF4-FFF2-40B4-BE49-F238E27FC236}">
-                <a16:creationId xmlns:a16="http://schemas.microsoft.com/office/drawing/2014/main" id="{A347F08D-CCA2-5B36-B638-16B251E5664D}"/>
-              </a:ext>
-            </a:extLst>
-          </p:cNvPr>
-          <p:cNvSpPr>
-            <a:spLocks noGrp="1"/>
-          </p:cNvSpPr>
-          <p:nvPr>
-            <p:ph type="title"/>
-          </p:nvPr>
-        </p:nvSpPr>
-        <p:spPr>
-          <a:xfrm>
-            <a:off x="876693" y="741391"/>
-            <a:ext cx="4597747" cy="1616203"/>
-          </a:xfrm>
-        </p:spPr>
-        <p:txBody>
-          <a:bodyPr anchor="b">
-            <a:normAutofit/>
-          </a:bodyPr>
-          <a:lstStyle/>
-          <a:p>
-            <a:r>
-              <a:rPr lang="de-AT" sz="3200"/>
-              <a:t>Ablaufdiagramm</a:t>
-            </a:r>
-          </a:p>
-        </p:txBody>
-      </p:sp>
-      <p:sp>
-        <p:nvSpPr>
-          <p:cNvPr id="13" name="Content Placeholder 12">
-            <a:extLst>
-              <a:ext uri="{FF2B5EF4-FFF2-40B4-BE49-F238E27FC236}">
-                <a16:creationId xmlns:a16="http://schemas.microsoft.com/office/drawing/2014/main" id="{D3D2F584-63A1-9EF4-BBE8-FED2E51281D0}"/>
-              </a:ext>
-            </a:extLst>
-          </p:cNvPr>
-          <p:cNvSpPr>
-            <a:spLocks noGrp="1"/>
-          </p:cNvSpPr>
-          <p:nvPr>
-            <p:ph idx="1"/>
-          </p:nvPr>
-        </p:nvSpPr>
-        <p:spPr>
-          <a:xfrm>
-            <a:off x="876693" y="2533476"/>
-            <a:ext cx="4597746" cy="3447832"/>
-          </a:xfrm>
-        </p:spPr>
-        <p:txBody>
-          <a:bodyPr anchor="t">
-            <a:normAutofit/>
-          </a:bodyPr>
-          <a:lstStyle/>
-          <a:p>
-            <a:endParaRPr lang="en-US" sz="2000"/>
-          </a:p>
-        </p:txBody>
-      </p:sp>
-      <p:pic>
-        <p:nvPicPr>
-          <p:cNvPr id="9" name="Inhaltsplatzhalter 8">
-            <a:extLst>
-              <a:ext uri="{FF2B5EF4-FFF2-40B4-BE49-F238E27FC236}">
-                <a16:creationId xmlns:a16="http://schemas.microsoft.com/office/drawing/2014/main" id="{AF90375B-4296-AC5F-A387-10FAEF981757}"/>
-              </a:ext>
-            </a:extLst>
-          </p:cNvPr>
-          <p:cNvPicPr>
-            <a:picLocks noChangeAspect="1"/>
-          </p:cNvPicPr>
-          <p:nvPr/>
-        </p:nvPicPr>
-        <p:blipFill>
-          <a:blip r:embed="rId2"/>
-          <a:stretch>
-            <a:fillRect/>
-          </a:stretch>
-        </p:blipFill>
-        <p:spPr>
-          <a:xfrm>
-            <a:off x="7739463" y="867064"/>
-            <a:ext cx="2032137" cy="5048790"/>
-          </a:xfrm>
-          <a:prstGeom prst="rect">
-            <a:avLst/>
-          </a:prstGeom>
-        </p:spPr>
-      </p:pic>
-      <p:grpSp>
-        <p:nvGrpSpPr>
-          <p:cNvPr id="23" name="Group 22">
-            <a:extLst>
-              <a:ext uri="{FF2B5EF4-FFF2-40B4-BE49-F238E27FC236}">
-                <a16:creationId xmlns:a16="http://schemas.microsoft.com/office/drawing/2014/main" id="{1FD67D68-9B83-C338-8342-3348D8F22347}"/>
-              </a:ext>
-              <a:ext uri="{C183D7F6-B498-43B3-948B-1728B52AA6E4}">
-                <adec:decorative xmlns:adec="http://schemas.microsoft.com/office/drawing/2017/decorative" val="1"/>
-              </a:ext>
-            </a:extLst>
-          </p:cNvPr>
-          <p:cNvGrpSpPr>
-            <a:grpSpLocks noGrp="1" noUngrp="1" noRot="1" noChangeAspect="1" noMove="1" noResize="1"/>
-          </p:cNvGrpSpPr>
-          <p:nvPr>
-            <p:extLst>
-              <p:ext uri="{386F3935-93C4-4BCD-93E2-E3B085C9AB24}">
-                <p16:designElem xmlns:p16="http://schemas.microsoft.com/office/powerpoint/2015/main" val="1"/>
-              </p:ext>
-            </p:extLst>
-          </p:nvPr>
-        </p:nvGrpSpPr>
-        <p:grpSpPr>
-          <a:xfrm>
-            <a:off x="-5025" y="6737718"/>
-            <a:ext cx="12207200" cy="123363"/>
-            <a:chOff x="-5025" y="6737718"/>
-            <a:chExt cx="12207200" cy="123363"/>
-          </a:xfrm>
-        </p:grpSpPr>
-        <p:sp>
-          <p:nvSpPr>
-            <p:cNvPr id="24" name="Rectangle 23">
-              <a:extLst>
-                <a:ext uri="{FF2B5EF4-FFF2-40B4-BE49-F238E27FC236}">
-                  <a16:creationId xmlns:a16="http://schemas.microsoft.com/office/drawing/2014/main" id="{1E397F34-6B84-0D3B-0F29-B1D134B3B885}"/>
-                </a:ext>
-                <a:ext uri="{C183D7F6-B498-43B3-948B-1728B52AA6E4}">
-                  <adec:decorative xmlns:adec="http://schemas.microsoft.com/office/drawing/2017/decorative" val="1"/>
-                </a:ext>
-              </a:extLst>
-            </p:cNvPr>
-            <p:cNvSpPr/>
-            <p:nvPr>
-              <p:extLst>
-                <p:ext uri="{386F3935-93C4-4BCD-93E2-E3B085C9AB24}">
-                  <p16:designElem xmlns:p16="http://schemas.microsoft.com/office/powerpoint/2015/main" val="1"/>
-                </p:ext>
-              </p:extLst>
-            </p:nvPr>
-          </p:nvSpPr>
-          <p:spPr>
-            <a:xfrm rot="5400000" flipH="1">
-              <a:off x="6036894" y="695800"/>
-              <a:ext cx="123362" cy="12207199"/>
-            </a:xfrm>
-            <a:prstGeom prst="rect">
-              <a:avLst/>
-            </a:prstGeom>
-            <a:gradFill>
-              <a:gsLst>
-                <a:gs pos="0">
-                  <a:schemeClr val="accent5"/>
-                </a:gs>
-                <a:gs pos="100000">
-                  <a:schemeClr val="accent2"/>
-                </a:gs>
-              </a:gsLst>
-              <a:lin ang="1800000" scaled="0"/>
-            </a:gradFill>
-            <a:ln>
-              <a:noFill/>
-            </a:ln>
-          </p:spPr>
-          <p:style>
-            <a:lnRef idx="2">
-              <a:schemeClr val="accent1">
-                <a:shade val="50000"/>
-              </a:schemeClr>
-            </a:lnRef>
-            <a:fillRef idx="1">
-              <a:schemeClr val="accent1"/>
-            </a:fillRef>
-            <a:effectRef idx="0">
-              <a:schemeClr val="accent1"/>
-            </a:effectRef>
-            <a:fontRef idx="minor">
-              <a:schemeClr val="lt1"/>
-            </a:fontRef>
-          </p:style>
-          <p:txBody>
-            <a:bodyPr rtlCol="0" anchor="ctr"/>
-            <a:lstStyle/>
-            <a:p>
-              <a:pPr algn="ctr"/>
-              <a:endParaRPr lang="en-US"/>
-            </a:p>
-          </p:txBody>
-        </p:sp>
-        <p:sp>
-          <p:nvSpPr>
-            <p:cNvPr id="25" name="Rectangle 24">
-              <a:extLst>
-                <a:ext uri="{FF2B5EF4-FFF2-40B4-BE49-F238E27FC236}">
-                  <a16:creationId xmlns:a16="http://schemas.microsoft.com/office/drawing/2014/main" id="{9BD98075-BFC1-BE9C-7FB7-23FE55E43393}"/>
-                </a:ext>
-                <a:ext uri="{C183D7F6-B498-43B3-948B-1728B52AA6E4}">
-                  <adec:decorative xmlns:adec="http://schemas.microsoft.com/office/drawing/2017/decorative" val="1"/>
-                </a:ext>
-              </a:extLst>
-            </p:cNvPr>
-            <p:cNvSpPr/>
-            <p:nvPr>
-              <p:extLst>
-                <p:ext uri="{386F3935-93C4-4BCD-93E2-E3B085C9AB24}">
-                  <p16:designElem xmlns:p16="http://schemas.microsoft.com/office/powerpoint/2015/main" val="1"/>
-                </p:ext>
-              </p:extLst>
-            </p:nvPr>
-          </p:nvSpPr>
-          <p:spPr>
-            <a:xfrm rot="16200000">
-              <a:off x="9176406" y="3835311"/>
-              <a:ext cx="123362" cy="5928176"/>
-            </a:xfrm>
-            <a:prstGeom prst="rect">
-              <a:avLst/>
-            </a:prstGeom>
-            <a:gradFill>
-              <a:gsLst>
-                <a:gs pos="19000">
-                  <a:schemeClr val="accent5">
-                    <a:alpha val="0"/>
-                  </a:schemeClr>
-                </a:gs>
-                <a:gs pos="100000">
-                  <a:schemeClr val="accent5">
-                    <a:lumMod val="60000"/>
-                    <a:lumOff val="40000"/>
-                  </a:schemeClr>
-                </a:gs>
-              </a:gsLst>
-              <a:lin ang="600000" scaled="0"/>
-            </a:gradFill>
-            <a:ln>
-              <a:noFill/>
-            </a:ln>
-          </p:spPr>
-          <p:style>
-            <a:lnRef idx="2">
-              <a:schemeClr val="accent1">
-                <a:shade val="50000"/>
-              </a:schemeClr>
-            </a:lnRef>
-            <a:fillRef idx="1">
-              <a:schemeClr val="accent1"/>
-            </a:fillRef>
-            <a:effectRef idx="0">
-              <a:schemeClr val="accent1"/>
-            </a:effectRef>
-            <a:fontRef idx="minor">
-              <a:schemeClr val="lt1"/>
-            </a:fontRef>
-          </p:style>
-          <p:txBody>
-            <a:bodyPr rtlCol="0" anchor="ctr"/>
-            <a:lstStyle/>
-            <a:p>
-              <a:pPr algn="ctr"/>
-              <a:endParaRPr lang="en-US"/>
-            </a:p>
-          </p:txBody>
-        </p:sp>
-      </p:grpSp>
-    </p:spTree>
-    <p:extLst>
-      <p:ext uri="{BB962C8B-B14F-4D97-AF65-F5344CB8AC3E}">
-        <p14:creationId xmlns:p14="http://schemas.microsoft.com/office/powerpoint/2010/main" val="3913988485"/>
-      </p:ext>
-    </p:extLst>
-  </p:cSld>
-  <p:clrMapOvr>
-    <a:masterClrMapping/>
-  </p:clrMapOvr>
-</p:sld>
-</file>
-
-<file path=ppt/slides/slide6.xml><?xml version="1.0" encoding="utf-8"?>
-<p:sld xmlns:a="http://schemas.openxmlformats.org/drawingml/2006/main" xmlns:r="http://schemas.openxmlformats.org/officeDocument/2006/relationships" xmlns:p="http://schemas.openxmlformats.org/presentationml/2006/main">
-  <p:cSld>
-    <p:bg>
-      <p:bgPr>
-        <a:solidFill>
-          <a:schemeClr val="bg1"/>
-        </a:solidFill>
-        <a:effectLst/>
-      </p:bgPr>
-    </p:bg>
-    <p:spTree>
-      <p:nvGrpSpPr>
-        <p:cNvPr id="1" name=""/>
-        <p:cNvGrpSpPr/>
-        <p:nvPr/>
-      </p:nvGrpSpPr>
-      <p:grpSpPr>
-        <a:xfrm>
-          <a:off x="0" y="0"/>
-          <a:ext cx="0" cy="0"/>
-          <a:chOff x="0" y="0"/>
-          <a:chExt cx="0" cy="0"/>
-        </a:xfrm>
-      </p:grpSpPr>
-      <p:sp>
-        <p:nvSpPr>
-          <p:cNvPr id="2" name="Titel 1">
-            <a:extLst>
-              <a:ext uri="{FF2B5EF4-FFF2-40B4-BE49-F238E27FC236}">
-                <a16:creationId xmlns:a16="http://schemas.microsoft.com/office/drawing/2014/main" id="{5A159083-3ABD-F78B-0B5E-233E87CE71A2}"/>
-              </a:ext>
-            </a:extLst>
-          </p:cNvPr>
-          <p:cNvSpPr>
-            <a:spLocks noGrp="1"/>
-          </p:cNvSpPr>
-          <p:nvPr>
-            <p:ph type="title"/>
-          </p:nvPr>
-        </p:nvSpPr>
-        <p:spPr>
-          <a:xfrm>
-            <a:off x="838199" y="1320126"/>
-            <a:ext cx="3806729" cy="3072359"/>
-          </a:xfrm>
-        </p:spPr>
-        <p:txBody>
-          <a:bodyPr vert="horz" lIns="91440" tIns="45720" rIns="91440" bIns="45720" rtlCol="0" anchor="t">
-            <a:normAutofit/>
-          </a:bodyPr>
-          <a:lstStyle/>
-          <a:p>
-            <a:r>
-              <a:rPr lang="en-US" sz="3700" kern="1200">
-                <a:solidFill>
-                  <a:schemeClr val="tx1"/>
-                </a:solidFill>
-                <a:latin typeface="+mj-lt"/>
-                <a:ea typeface="+mj-ea"/>
-                <a:cs typeface="+mj-cs"/>
-              </a:rPr>
-              <a:t>Klassendiagramm</a:t>
-            </a:r>
-          </a:p>
-        </p:txBody>
-      </p:sp>
-      <p:pic>
-        <p:nvPicPr>
-          <p:cNvPr id="7" name="Grafik 6" descr="Ein Bild, das Text, Diagramm, Screenshot, parallel enthält.&#10;&#10;KI-generierte Inhalte können fehlerhaft sein.">
-            <a:extLst>
-              <a:ext uri="{FF2B5EF4-FFF2-40B4-BE49-F238E27FC236}">
-                <a16:creationId xmlns:a16="http://schemas.microsoft.com/office/drawing/2014/main" id="{4DDFF3A2-FA16-1C3A-905B-5A859382DAC9}"/>
-              </a:ext>
-            </a:extLst>
-          </p:cNvPr>
-          <p:cNvPicPr>
-            <a:picLocks noChangeAspect="1"/>
-          </p:cNvPicPr>
-          <p:nvPr/>
-        </p:nvPicPr>
-        <p:blipFill>
-          <a:blip r:embed="rId2"/>
-          <a:stretch>
-            <a:fillRect/>
-          </a:stretch>
-        </p:blipFill>
-        <p:spPr>
-          <a:xfrm>
-            <a:off x="5463389" y="1181996"/>
-            <a:ext cx="5941497" cy="4352147"/>
-          </a:xfrm>
-          <a:prstGeom prst="rect">
-            <a:avLst/>
-          </a:prstGeom>
-        </p:spPr>
-      </p:pic>
-      <p:grpSp>
-        <p:nvGrpSpPr>
-          <p:cNvPr id="12" name="Group 11">
-            <a:extLst>
-              <a:ext uri="{FF2B5EF4-FFF2-40B4-BE49-F238E27FC236}">
-                <a16:creationId xmlns:a16="http://schemas.microsoft.com/office/drawing/2014/main" id="{71E4E172-1EA7-E251-8265-AD4D67315470}"/>
-              </a:ext>
-              <a:ext uri="{C183D7F6-B498-43B3-948B-1728B52AA6E4}">
-                <adec:decorative xmlns:adec="http://schemas.microsoft.com/office/drawing/2017/decorative" val="1"/>
-              </a:ext>
-            </a:extLst>
-          </p:cNvPr>
-          <p:cNvGrpSpPr>
-            <a:grpSpLocks noGrp="1" noUngrp="1" noRot="1" noChangeAspect="1" noMove="1" noResize="1"/>
-          </p:cNvGrpSpPr>
-          <p:nvPr>
-            <p:extLst>
-              <p:ext uri="{386F3935-93C4-4BCD-93E2-E3B085C9AB24}">
-                <p16:designElem xmlns:p16="http://schemas.microsoft.com/office/powerpoint/2015/main" val="1"/>
-              </p:ext>
-            </p:extLst>
-          </p:nvPr>
-        </p:nvGrpSpPr>
-        <p:grpSpPr>
-          <a:xfrm>
-            <a:off x="-5025" y="6737718"/>
-            <a:ext cx="12207200" cy="123363"/>
-            <a:chOff x="-5025" y="6737718"/>
-            <a:chExt cx="12207200" cy="123363"/>
-          </a:xfrm>
-        </p:grpSpPr>
-        <p:sp>
-          <p:nvSpPr>
-            <p:cNvPr id="13" name="Rectangle 12">
-              <a:extLst>
-                <a:ext uri="{FF2B5EF4-FFF2-40B4-BE49-F238E27FC236}">
-                  <a16:creationId xmlns:a16="http://schemas.microsoft.com/office/drawing/2014/main" id="{B36EE4C1-7905-4652-A645-D2C3112E2F79}"/>
-                </a:ext>
-                <a:ext uri="{C183D7F6-B498-43B3-948B-1728B52AA6E4}">
-                  <adec:decorative xmlns:adec="http://schemas.microsoft.com/office/drawing/2017/decorative" val="1"/>
-                </a:ext>
-              </a:extLst>
-            </p:cNvPr>
-            <p:cNvSpPr/>
-            <p:nvPr>
-              <p:extLst>
-                <p:ext uri="{386F3935-93C4-4BCD-93E2-E3B085C9AB24}">
-                  <p16:designElem xmlns:p16="http://schemas.microsoft.com/office/powerpoint/2015/main" val="1"/>
-                </p:ext>
-              </p:extLst>
-            </p:nvPr>
-          </p:nvSpPr>
-          <p:spPr>
-            <a:xfrm rot="5400000" flipH="1">
-              <a:off x="6036894" y="695800"/>
-              <a:ext cx="123362" cy="12207199"/>
-            </a:xfrm>
-            <a:prstGeom prst="rect">
-              <a:avLst/>
-            </a:prstGeom>
-            <a:gradFill>
-              <a:gsLst>
-                <a:gs pos="0">
-                  <a:schemeClr val="accent5"/>
-                </a:gs>
-                <a:gs pos="100000">
-                  <a:schemeClr val="accent2"/>
-                </a:gs>
-              </a:gsLst>
-              <a:lin ang="1800000" scaled="0"/>
-            </a:gradFill>
-            <a:ln>
-              <a:noFill/>
-            </a:ln>
-          </p:spPr>
-          <p:style>
-            <a:lnRef idx="2">
-              <a:schemeClr val="accent1">
-                <a:shade val="50000"/>
-              </a:schemeClr>
-            </a:lnRef>
-            <a:fillRef idx="1">
-              <a:schemeClr val="accent1"/>
-            </a:fillRef>
-            <a:effectRef idx="0">
-              <a:schemeClr val="accent1"/>
-            </a:effectRef>
-            <a:fontRef idx="minor">
-              <a:schemeClr val="lt1"/>
-            </a:fontRef>
-          </p:style>
-          <p:txBody>
-            <a:bodyPr rtlCol="0" anchor="ctr"/>
-            <a:lstStyle/>
-            <a:p>
-              <a:pPr algn="ctr"/>
-              <a:endParaRPr lang="en-US"/>
-            </a:p>
-          </p:txBody>
-        </p:sp>
-        <p:sp>
-          <p:nvSpPr>
-            <p:cNvPr id="14" name="Rectangle 13">
-              <a:extLst>
-                <a:ext uri="{FF2B5EF4-FFF2-40B4-BE49-F238E27FC236}">
-                  <a16:creationId xmlns:a16="http://schemas.microsoft.com/office/drawing/2014/main" id="{5B2D6870-BDC0-AE8B-A7F5-D570327D12E0}"/>
-                </a:ext>
-                <a:ext uri="{C183D7F6-B498-43B3-948B-1728B52AA6E4}">
-                  <adec:decorative xmlns:adec="http://schemas.microsoft.com/office/drawing/2017/decorative" val="1"/>
-                </a:ext>
-              </a:extLst>
-            </p:cNvPr>
-            <p:cNvSpPr/>
-            <p:nvPr>
-              <p:extLst>
-                <p:ext uri="{386F3935-93C4-4BCD-93E2-E3B085C9AB24}">
-                  <p16:designElem xmlns:p16="http://schemas.microsoft.com/office/powerpoint/2015/main" val="1"/>
-                </p:ext>
-              </p:extLst>
-            </p:nvPr>
-          </p:nvSpPr>
-          <p:spPr>
-            <a:xfrm rot="16200000">
-              <a:off x="9176406" y="3835311"/>
-              <a:ext cx="123362" cy="5928176"/>
-            </a:xfrm>
-            <a:prstGeom prst="rect">
-              <a:avLst/>
-            </a:prstGeom>
-            <a:gradFill>
-              <a:gsLst>
-                <a:gs pos="19000">
-                  <a:schemeClr val="accent5">
-                    <a:alpha val="0"/>
-                  </a:schemeClr>
-                </a:gs>
-                <a:gs pos="100000">
-                  <a:schemeClr val="accent5">
-                    <a:lumMod val="60000"/>
-                    <a:lumOff val="40000"/>
-                  </a:schemeClr>
-                </a:gs>
-              </a:gsLst>
-              <a:lin ang="600000" scaled="0"/>
-            </a:gradFill>
-            <a:ln>
-              <a:noFill/>
-            </a:ln>
-          </p:spPr>
-          <p:style>
-            <a:lnRef idx="2">
-              <a:schemeClr val="accent1">
-                <a:shade val="50000"/>
-              </a:schemeClr>
-            </a:lnRef>
-            <a:fillRef idx="1">
-              <a:schemeClr val="accent1"/>
-            </a:fillRef>
-            <a:effectRef idx="0">
-              <a:schemeClr val="accent1"/>
-            </a:effectRef>
-            <a:fontRef idx="minor">
-              <a:schemeClr val="lt1"/>
-            </a:fontRef>
-          </p:style>
-          <p:txBody>
-            <a:bodyPr rtlCol="0" anchor="ctr"/>
-            <a:lstStyle/>
-            <a:p>
-              <a:pPr algn="ctr"/>
-              <a:endParaRPr lang="en-US"/>
-            </a:p>
-          </p:txBody>
-        </p:sp>
-      </p:grpSp>
-    </p:spTree>
-    <p:extLst>
-      <p:ext uri="{BB962C8B-B14F-4D97-AF65-F5344CB8AC3E}">
-        <p14:creationId xmlns:p14="http://schemas.microsoft.com/office/powerpoint/2010/main" val="1150393402"/>
-      </p:ext>
-    </p:extLst>
-  </p:cSld>
-  <p:clrMapOvr>
-    <a:masterClrMapping/>
-  </p:clrMapOvr>
-</p:sld>
-</file>
-
-<file path=ppt/slides/slide7.xml><?xml version="1.0" encoding="utf-8"?>
-<p:sld xmlns:a="http://schemas.openxmlformats.org/drawingml/2006/main" xmlns:r="http://schemas.openxmlformats.org/officeDocument/2006/relationships" xmlns:p="http://schemas.openxmlformats.org/presentationml/2006/main">
-  <p:cSld>
     <p:spTree>
       <p:nvGrpSpPr>
         <p:cNvPr id="1" name=""/>

</xml_diff>